<commit_message>
corrected the meta-information of the pptx slide
</commit_message>
<xml_diff>
--- a/slide_boostjp.pptx
+++ b/slide_boostjp.pptx
@@ -292,7 +292,7 @@
             <a:fld id="{596C7B29-C8F9-41D9-AE2D-BBF686F78D0E}" type="datetimeFigureOut">
               <a:rPr kumimoji="1" lang="ja-JP" altLang="en-US" smtClean="0"/>
               <a:pPr/>
-              <a:t>2009/12/12</a:t>
+              <a:t>2009/12/18</a:t>
             </a:fld>
             <a:endParaRPr kumimoji="1" lang="ja-JP" altLang="en-US"/>
           </a:p>
@@ -455,7 +455,7 @@
             <a:fld id="{6E43E40B-A726-4A61-BD3E-9A6DEE9719A1}" type="datetimeFigureOut">
               <a:rPr kumimoji="1" lang="ja-JP" altLang="en-US" smtClean="0"/>
               <a:pPr/>
-              <a:t>2009/12/12</a:t>
+              <a:t>2009/12/18</a:t>
             </a:fld>
             <a:endParaRPr kumimoji="1" lang="ja-JP" altLang="en-US"/>
           </a:p>
@@ -13519,39 +13519,27 @@
               <a:rPr kumimoji="1" lang="en-US" altLang="ja-JP" sz="3200" b="1" dirty="0" smtClean="0">
                 <a:latin typeface="Consolas" pitchFamily="49" charset="0"/>
               </a:rPr>
-              <a:t>tt2.erase</a:t>
+              <a:t>tt2.erase(…</a:t>
+            </a:r>
+            <a:r>
+              <a:rPr kumimoji="1" lang="ja-JP" altLang="en-US" sz="3200" b="1" dirty="0" smtClean="0">
+                <a:latin typeface="Consolas" pitchFamily="49" charset="0"/>
+              </a:rPr>
+              <a:t>略</a:t>
             </a:r>
             <a:r>
               <a:rPr kumimoji="1" lang="en-US" altLang="ja-JP" sz="3200" b="1" dirty="0" smtClean="0">
                 <a:latin typeface="Consolas" pitchFamily="49" charset="0"/>
               </a:rPr>
-              <a:t>(…</a:t>
-            </a:r>
-            <a:r>
-              <a:rPr kumimoji="1" lang="ja-JP" altLang="en-US" sz="3200" b="1" dirty="0" smtClean="0">
-                <a:latin typeface="Consolas" pitchFamily="49" charset="0"/>
-              </a:rPr>
-              <a:t>略</a:t>
-            </a:r>
+              <a:t>…);</a:t>
+            </a:r>
+          </a:p>
+          <a:p>
             <a:r>
               <a:rPr kumimoji="1" lang="en-US" altLang="ja-JP" sz="3200" b="1" dirty="0" smtClean="0">
                 <a:latin typeface="Consolas" pitchFamily="49" charset="0"/>
               </a:rPr>
-              <a:t>…);</a:t>
-            </a:r>
-          </a:p>
-          <a:p>
-            <a:r>
-              <a:rPr kumimoji="1" lang="en-US" altLang="ja-JP" sz="3200" b="1" dirty="0" smtClean="0">
-                <a:latin typeface="Consolas" pitchFamily="49" charset="0"/>
-              </a:rPr>
-              <a:t>tt3.erase</a:t>
-            </a:r>
-            <a:r>
-              <a:rPr kumimoji="1" lang="en-US" altLang="ja-JP" sz="3200" b="1" dirty="0" smtClean="0">
-                <a:latin typeface="Consolas" pitchFamily="49" charset="0"/>
-              </a:rPr>
-              <a:t>(…</a:t>
+              <a:t>tt3.erase(…</a:t>
             </a:r>
             <a:r>
               <a:rPr kumimoji="1" lang="ja-JP" altLang="en-US" sz="3200" b="1" dirty="0" smtClean="0">
@@ -13745,11 +13733,7 @@
             </a:r>
             <a:r>
               <a:rPr kumimoji="1" lang="ja-JP" altLang="en-US" sz="6000" dirty="0" smtClean="0"/>
-              <a:t>＆ </a:t>
-            </a:r>
-            <a:r>
-              <a:rPr kumimoji="1" lang="ja-JP" altLang="en-US" sz="6000" dirty="0" smtClean="0"/>
-              <a:t>一瞬</a:t>
+              <a:t>＆ 一瞬</a:t>
             </a:r>
             <a:endParaRPr kumimoji="1" lang="ja-JP" altLang="en-US" sz="6000" dirty="0"/>
           </a:p>
@@ -13796,7 +13780,16 @@
                 </a:solidFill>
                 <a:latin typeface="Consolas" pitchFamily="49" charset="0"/>
               </a:rPr>
-              <a:t>&lt;0&gt;().erase</a:t>
+              <a:t>&lt;0&gt;().erase(“</a:t>
+            </a:r>
+            <a:r>
+              <a:rPr kumimoji="1" lang="en-US" altLang="ja-JP" sz="4000" b="1" dirty="0" err="1" smtClean="0">
+                <a:solidFill>
+                  <a:srgbClr val="FF0000"/>
+                </a:solidFill>
+                <a:latin typeface="Consolas" pitchFamily="49" charset="0"/>
+              </a:rPr>
+              <a:t>kinaba</a:t>
             </a:r>
             <a:r>
               <a:rPr kumimoji="1" lang="en-US" altLang="ja-JP" sz="4000" b="1" dirty="0" smtClean="0">
@@ -13805,32 +13798,8 @@
                 </a:solidFill>
                 <a:latin typeface="Consolas" pitchFamily="49" charset="0"/>
               </a:rPr>
-              <a:t>(“</a:t>
-            </a:r>
-            <a:r>
-              <a:rPr kumimoji="1" lang="en-US" altLang="ja-JP" sz="4000" b="1" dirty="0" err="1" smtClean="0">
-                <a:solidFill>
-                  <a:srgbClr val="FF0000"/>
-                </a:solidFill>
-                <a:latin typeface="Consolas" pitchFamily="49" charset="0"/>
-              </a:rPr>
-              <a:t>kinaba</a:t>
-            </a:r>
-            <a:r>
-              <a:rPr kumimoji="1" lang="en-US" altLang="ja-JP" sz="4000" b="1" dirty="0" smtClean="0">
-                <a:solidFill>
-                  <a:srgbClr val="FF0000"/>
-                </a:solidFill>
-                <a:latin typeface="Consolas" pitchFamily="49" charset="0"/>
-              </a:rPr>
               <a:t>”);</a:t>
             </a:r>
-            <a:endParaRPr kumimoji="1" lang="en-US" altLang="ja-JP" sz="4000" b="1" dirty="0" smtClean="0">
-              <a:solidFill>
-                <a:srgbClr val="FF0000"/>
-              </a:solidFill>
-              <a:latin typeface="Consolas" pitchFamily="49" charset="0"/>
-            </a:endParaRPr>
           </a:p>
         </p:txBody>
       </p:sp>
@@ -14668,11 +14637,7 @@
           <a:p>
             <a:r>
               <a:rPr kumimoji="1" lang="ja-JP" altLang="en-US" sz="3200" dirty="0" smtClean="0"/>
-              <a:t>色んなインデックスを</a:t>
-            </a:r>
-            <a:r>
-              <a:rPr kumimoji="1" lang="ja-JP" altLang="en-US" sz="3200" dirty="0" smtClean="0"/>
-              <a:t>付けられる</a:t>
+              <a:t>色んなインデックスを付けられる</a:t>
             </a:r>
             <a:endParaRPr lang="en-US" altLang="ja-JP" sz="2800" dirty="0" smtClean="0"/>
           </a:p>
@@ -14693,19 +14658,11 @@
             </a:r>
             <a:r>
               <a:rPr lang="en-US" altLang="ja-JP" sz="2800" dirty="0" smtClean="0"/>
-              <a:t>0, 1, 2, …</a:t>
-            </a:r>
-            <a:r>
-              <a:rPr lang="en-US" altLang="ja-JP" sz="2800" dirty="0" smtClean="0"/>
-              <a:t> </a:t>
+              <a:t>0, 1, 2, … </a:t>
             </a:r>
             <a:r>
               <a:rPr lang="ja-JP" altLang="en-US" sz="2800" dirty="0" smtClean="0"/>
-              <a:t>でなく、タグも</a:t>
-            </a:r>
-            <a:r>
-              <a:rPr lang="ja-JP" altLang="en-US" sz="2800" dirty="0" smtClean="0"/>
-              <a:t>付けられます</a:t>
+              <a:t>でなく、タグも付けられます</a:t>
             </a:r>
             <a:endParaRPr lang="en-US" altLang="ja-JP" sz="2800" dirty="0" smtClean="0"/>
           </a:p>
@@ -14782,13 +14739,7 @@
               <a:rPr lang="en-US" altLang="ja-JP" sz="2400" b="1" dirty="0" err="1" smtClean="0">
                 <a:latin typeface="Consolas" pitchFamily="49" charset="0"/>
               </a:rPr>
-              <a:t>m</a:t>
-            </a:r>
-            <a:r>
-              <a:rPr lang="en-US" altLang="ja-JP" sz="2400" b="1" dirty="0" err="1" smtClean="0">
-                <a:latin typeface="Consolas" pitchFamily="49" charset="0"/>
-              </a:rPr>
-              <a:t>ulti_index_container</a:t>
+              <a:t>multi_index_container</a:t>
             </a:r>
             <a:r>
               <a:rPr lang="en-US" altLang="ja-JP" sz="2400" b="1" dirty="0" smtClean="0">
@@ -15083,11 +15034,7 @@
           <a:p>
             <a:r>
               <a:rPr lang="ja-JP" altLang="en-US" sz="3200" dirty="0" smtClean="0"/>
-              <a:t>実は</a:t>
-            </a:r>
-            <a:r>
-              <a:rPr lang="ja-JP" altLang="en-US" sz="3200" dirty="0" smtClean="0"/>
-              <a:t>むしろ普通のコンテナより便利</a:t>
+              <a:t>実はむしろ普通のコンテナより便利</a:t>
             </a:r>
             <a:endParaRPr lang="en-US" altLang="ja-JP" sz="3200" dirty="0" smtClean="0"/>
           </a:p>
@@ -20865,15 +20812,7 @@
                   <a:srgbClr val="309030"/>
                 </a:solidFill>
               </a:rPr>
-              <a:t>整理はされてる</a:t>
-            </a:r>
-            <a:r>
-              <a:rPr lang="ja-JP" altLang="en-US" sz="4800" b="1" dirty="0" smtClean="0">
-                <a:solidFill>
-                  <a:srgbClr val="309030"/>
-                </a:solidFill>
-              </a:rPr>
-              <a:t>！</a:t>
+              <a:t>整理はされてる！</a:t>
             </a:r>
             <a:r>
               <a:rPr lang="en-US" altLang="ja-JP" sz="4800" b="1" dirty="0" smtClean="0">
@@ -20896,15 +20835,7 @@
                   <a:srgbClr val="309030"/>
                 </a:solidFill>
               </a:rPr>
-              <a:t>（</a:t>
-            </a:r>
-            <a:r>
-              <a:rPr lang="ja-JP" altLang="en-US" sz="3600" b="1" dirty="0" smtClean="0">
-                <a:solidFill>
-                  <a:srgbClr val="309030"/>
-                </a:solidFill>
-              </a:rPr>
-              <a:t>ドキュメントないけど！）</a:t>
+              <a:t>（ドキュメントないけど！）</a:t>
             </a:r>
             <a:endParaRPr kumimoji="0" lang="ja-JP" altLang="en-US" sz="4800" b="1" i="0" u="none" strike="noStrike" cap="none" normalizeH="0" baseline="0" dirty="0" smtClean="0">
               <a:ln>

</xml_diff>